<commit_message>
Mise à jour spécialisation
Ajout d'une limite dans le cdc et nouvelle vue proposée pour la vue
Gestion BdD.
</commit_message>
<xml_diff>
--- a/modelisation/affichageGestionBdD.pptx
+++ b/modelisation/affichageGestionBdD.pptx
@@ -9,6 +9,7 @@
     <p:sldId id="257" r:id="rId3"/>
     <p:sldId id="258" r:id="rId4"/>
     <p:sldId id="259" r:id="rId5"/>
+    <p:sldId id="260" r:id="rId6"/>
   </p:sldIdLst>
   <p:sldSz cx="9144000" cy="6858000" type="screen4x3"/>
   <p:notesSz cx="6858000" cy="9144000"/>
@@ -291,6 +292,7 @@
           <a:p>
             <a:fld id="{54FA37A2-7FAA-471E-93AA-DED65F436505}" type="datetimeFigureOut">
               <a:rPr lang="fr-FR" smtClean="0"/>
+              <a:pPr/>
               <a:t>17/03/2015</a:t>
             </a:fld>
             <a:endParaRPr lang="fr-FR"/>
@@ -333,6 +335,7 @@
           <a:p>
             <a:fld id="{7B88E05F-D0B5-4E9F-9D28-AF584ABFCB32}" type="slidenum">
               <a:rPr lang="fr-FR" smtClean="0"/>
+              <a:pPr/>
               <a:t>‹N°›</a:t>
             </a:fld>
             <a:endParaRPr lang="fr-FR"/>
@@ -456,6 +459,7 @@
           <a:p>
             <a:fld id="{54FA37A2-7FAA-471E-93AA-DED65F436505}" type="datetimeFigureOut">
               <a:rPr lang="fr-FR" smtClean="0"/>
+              <a:pPr/>
               <a:t>17/03/2015</a:t>
             </a:fld>
             <a:endParaRPr lang="fr-FR"/>
@@ -498,6 +502,7 @@
           <a:p>
             <a:fld id="{7B88E05F-D0B5-4E9F-9D28-AF584ABFCB32}" type="slidenum">
               <a:rPr lang="fr-FR" smtClean="0"/>
+              <a:pPr/>
               <a:t>‹N°›</a:t>
             </a:fld>
             <a:endParaRPr lang="fr-FR"/>
@@ -631,6 +636,7 @@
           <a:p>
             <a:fld id="{54FA37A2-7FAA-471E-93AA-DED65F436505}" type="datetimeFigureOut">
               <a:rPr lang="fr-FR" smtClean="0"/>
+              <a:pPr/>
               <a:t>17/03/2015</a:t>
             </a:fld>
             <a:endParaRPr lang="fr-FR"/>
@@ -673,6 +679,7 @@
           <a:p>
             <a:fld id="{7B88E05F-D0B5-4E9F-9D28-AF584ABFCB32}" type="slidenum">
               <a:rPr lang="fr-FR" smtClean="0"/>
+              <a:pPr/>
               <a:t>‹N°›</a:t>
             </a:fld>
             <a:endParaRPr lang="fr-FR"/>
@@ -796,6 +803,7 @@
           <a:p>
             <a:fld id="{54FA37A2-7FAA-471E-93AA-DED65F436505}" type="datetimeFigureOut">
               <a:rPr lang="fr-FR" smtClean="0"/>
+              <a:pPr/>
               <a:t>17/03/2015</a:t>
             </a:fld>
             <a:endParaRPr lang="fr-FR"/>
@@ -838,6 +846,7 @@
           <a:p>
             <a:fld id="{7B88E05F-D0B5-4E9F-9D28-AF584ABFCB32}" type="slidenum">
               <a:rPr lang="fr-FR" smtClean="0"/>
+              <a:pPr/>
               <a:t>‹N°›</a:t>
             </a:fld>
             <a:endParaRPr lang="fr-FR"/>
@@ -1037,6 +1046,7 @@
           <a:p>
             <a:fld id="{54FA37A2-7FAA-471E-93AA-DED65F436505}" type="datetimeFigureOut">
               <a:rPr lang="fr-FR" smtClean="0"/>
+              <a:pPr/>
               <a:t>17/03/2015</a:t>
             </a:fld>
             <a:endParaRPr lang="fr-FR"/>
@@ -1079,6 +1089,7 @@
           <a:p>
             <a:fld id="{7B88E05F-D0B5-4E9F-9D28-AF584ABFCB32}" type="slidenum">
               <a:rPr lang="fr-FR" smtClean="0"/>
+              <a:pPr/>
               <a:t>‹N°›</a:t>
             </a:fld>
             <a:endParaRPr lang="fr-FR"/>
@@ -1320,6 +1331,7 @@
           <a:p>
             <a:fld id="{54FA37A2-7FAA-471E-93AA-DED65F436505}" type="datetimeFigureOut">
               <a:rPr lang="fr-FR" smtClean="0"/>
+              <a:pPr/>
               <a:t>17/03/2015</a:t>
             </a:fld>
             <a:endParaRPr lang="fr-FR"/>
@@ -1362,6 +1374,7 @@
           <a:p>
             <a:fld id="{7B88E05F-D0B5-4E9F-9D28-AF584ABFCB32}" type="slidenum">
               <a:rPr lang="fr-FR" smtClean="0"/>
+              <a:pPr/>
               <a:t>‹N°›</a:t>
             </a:fld>
             <a:endParaRPr lang="fr-FR"/>
@@ -1737,6 +1750,7 @@
           <a:p>
             <a:fld id="{54FA37A2-7FAA-471E-93AA-DED65F436505}" type="datetimeFigureOut">
               <a:rPr lang="fr-FR" smtClean="0"/>
+              <a:pPr/>
               <a:t>17/03/2015</a:t>
             </a:fld>
             <a:endParaRPr lang="fr-FR"/>
@@ -1779,6 +1793,7 @@
           <a:p>
             <a:fld id="{7B88E05F-D0B5-4E9F-9D28-AF584ABFCB32}" type="slidenum">
               <a:rPr lang="fr-FR" smtClean="0"/>
+              <a:pPr/>
               <a:t>‹N°›</a:t>
             </a:fld>
             <a:endParaRPr lang="fr-FR"/>
@@ -1850,6 +1865,7 @@
           <a:p>
             <a:fld id="{54FA37A2-7FAA-471E-93AA-DED65F436505}" type="datetimeFigureOut">
               <a:rPr lang="fr-FR" smtClean="0"/>
+              <a:pPr/>
               <a:t>17/03/2015</a:t>
             </a:fld>
             <a:endParaRPr lang="fr-FR"/>
@@ -1892,6 +1908,7 @@
           <a:p>
             <a:fld id="{7B88E05F-D0B5-4E9F-9D28-AF584ABFCB32}" type="slidenum">
               <a:rPr lang="fr-FR" smtClean="0"/>
+              <a:pPr/>
               <a:t>‹N°›</a:t>
             </a:fld>
             <a:endParaRPr lang="fr-FR"/>
@@ -1940,6 +1957,7 @@
           <a:p>
             <a:fld id="{54FA37A2-7FAA-471E-93AA-DED65F436505}" type="datetimeFigureOut">
               <a:rPr lang="fr-FR" smtClean="0"/>
+              <a:pPr/>
               <a:t>17/03/2015</a:t>
             </a:fld>
             <a:endParaRPr lang="fr-FR"/>
@@ -1982,6 +2000,7 @@
           <a:p>
             <a:fld id="{7B88E05F-D0B5-4E9F-9D28-AF584ABFCB32}" type="slidenum">
               <a:rPr lang="fr-FR" smtClean="0"/>
+              <a:pPr/>
               <a:t>‹N°›</a:t>
             </a:fld>
             <a:endParaRPr lang="fr-FR"/>
@@ -2212,6 +2231,7 @@
           <a:p>
             <a:fld id="{54FA37A2-7FAA-471E-93AA-DED65F436505}" type="datetimeFigureOut">
               <a:rPr lang="fr-FR" smtClean="0"/>
+              <a:pPr/>
               <a:t>17/03/2015</a:t>
             </a:fld>
             <a:endParaRPr lang="fr-FR"/>
@@ -2254,6 +2274,7 @@
           <a:p>
             <a:fld id="{7B88E05F-D0B5-4E9F-9D28-AF584ABFCB32}" type="slidenum">
               <a:rPr lang="fr-FR" smtClean="0"/>
+              <a:pPr/>
               <a:t>‹N°›</a:t>
             </a:fld>
             <a:endParaRPr lang="fr-FR"/>
@@ -2460,6 +2481,7 @@
           <a:p>
             <a:fld id="{54FA37A2-7FAA-471E-93AA-DED65F436505}" type="datetimeFigureOut">
               <a:rPr lang="fr-FR" smtClean="0"/>
+              <a:pPr/>
               <a:t>17/03/2015</a:t>
             </a:fld>
             <a:endParaRPr lang="fr-FR"/>
@@ -2502,6 +2524,7 @@
           <a:p>
             <a:fld id="{7B88E05F-D0B5-4E9F-9D28-AF584ABFCB32}" type="slidenum">
               <a:rPr lang="fr-FR" smtClean="0"/>
+              <a:pPr/>
               <a:t>‹N°›</a:t>
             </a:fld>
             <a:endParaRPr lang="fr-FR"/>
@@ -2668,6 +2691,7 @@
           <a:p>
             <a:fld id="{54FA37A2-7FAA-471E-93AA-DED65F436505}" type="datetimeFigureOut">
               <a:rPr lang="fr-FR" smtClean="0"/>
+              <a:pPr/>
               <a:t>17/03/2015</a:t>
             </a:fld>
             <a:endParaRPr lang="fr-FR"/>
@@ -2746,6 +2770,7 @@
           <a:p>
             <a:fld id="{7B88E05F-D0B5-4E9F-9D28-AF584ABFCB32}" type="slidenum">
               <a:rPr lang="fr-FR" smtClean="0"/>
+              <a:pPr/>
               <a:t>‹N°›</a:t>
             </a:fld>
             <a:endParaRPr lang="fr-FR"/>
@@ -7205,6 +7230,692 @@
               <a:rPr lang="fr-FR" dirty="0" smtClean="0"/>
               <a:t>Supprimer</a:t>
             </a:r>
+          </a:p>
+        </p:txBody>
+      </p:sp>
+    </p:spTree>
+  </p:cSld>
+  <p:clrMapOvr>
+    <a:masterClrMapping/>
+  </p:clrMapOvr>
+  <p:timing>
+    <p:tnLst>
+      <p:par>
+        <p:cTn id="1" dur="indefinite" restart="never" nodeType="tmRoot"/>
+      </p:par>
+    </p:tnLst>
+  </p:timing>
+</p:sld>
+</file>
+
+<file path=ppt/slides/slide5.xml><?xml version="1.0" encoding="utf-8"?>
+<p:sld xmlns:a="http://schemas.openxmlformats.org/drawingml/2006/main" xmlns:r="http://schemas.openxmlformats.org/officeDocument/2006/relationships" xmlns:p="http://schemas.openxmlformats.org/presentationml/2006/main">
+  <p:cSld>
+    <p:spTree>
+      <p:nvGrpSpPr>
+        <p:cNvPr id="1" name=""/>
+        <p:cNvGrpSpPr/>
+        <p:nvPr/>
+      </p:nvGrpSpPr>
+      <p:grpSpPr>
+        <a:xfrm>
+          <a:off x="0" y="0"/>
+          <a:ext cx="0" cy="0"/>
+          <a:chOff x="0" y="0"/>
+          <a:chExt cx="0" cy="0"/>
+        </a:xfrm>
+      </p:grpSpPr>
+      <p:graphicFrame>
+        <p:nvGraphicFramePr>
+          <p:cNvPr id="7" name="Tableau 6"/>
+          <p:cNvGraphicFramePr>
+            <a:graphicFrameLocks noGrp="1"/>
+          </p:cNvGraphicFramePr>
+          <p:nvPr/>
+        </p:nvGraphicFramePr>
+        <p:xfrm>
+          <a:off x="642908" y="428607"/>
+          <a:ext cx="8143936" cy="6110184"/>
+        </p:xfrm>
+        <a:graphic>
+          <a:graphicData uri="http://schemas.openxmlformats.org/drawingml/2006/table">
+            <a:tbl>
+              <a:tblPr firstRow="1" bandRow="1">
+                <a:tableStyleId>{5C22544A-7EE6-4342-B048-85BDC9FD1C3A}</a:tableStyleId>
+              </a:tblPr>
+              <a:tblGrid>
+                <a:gridCol w="2035984"/>
+                <a:gridCol w="2035984"/>
+                <a:gridCol w="2035984"/>
+                <a:gridCol w="2035984"/>
+              </a:tblGrid>
+              <a:tr h="509182">
+                <a:tc>
+                  <a:txBody>
+                    <a:bodyPr/>
+                    <a:lstStyle/>
+                    <a:p>
+                      <a:r>
+                        <a:rPr lang="fr-FR" dirty="0" smtClean="0"/>
+                        <a:t>ID</a:t>
+                      </a:r>
+                      <a:endParaRPr lang="fr-FR" dirty="0"/>
+                    </a:p>
+                  </a:txBody>
+                  <a:tcPr/>
+                </a:tc>
+                <a:tc>
+                  <a:txBody>
+                    <a:bodyPr/>
+                    <a:lstStyle/>
+                    <a:p>
+                      <a:r>
+                        <a:rPr lang="fr-FR" dirty="0" smtClean="0"/>
+                        <a:t>Nom</a:t>
+                      </a:r>
+                      <a:endParaRPr lang="fr-FR" dirty="0"/>
+                    </a:p>
+                  </a:txBody>
+                  <a:tcPr/>
+                </a:tc>
+                <a:tc>
+                  <a:txBody>
+                    <a:bodyPr/>
+                    <a:lstStyle/>
+                    <a:p>
+                      <a:r>
+                        <a:rPr lang="fr-FR" dirty="0" smtClean="0"/>
+                        <a:t>Poids</a:t>
+                      </a:r>
+                      <a:endParaRPr lang="fr-FR" dirty="0"/>
+                    </a:p>
+                  </a:txBody>
+                  <a:tcPr/>
+                </a:tc>
+                <a:tc>
+                  <a:txBody>
+                    <a:bodyPr/>
+                    <a:lstStyle/>
+                    <a:p>
+                      <a:r>
+                        <a:rPr lang="fr-FR" dirty="0" smtClean="0"/>
+                        <a:t>Quantité</a:t>
+                      </a:r>
+                      <a:endParaRPr lang="fr-FR" dirty="0"/>
+                    </a:p>
+                  </a:txBody>
+                  <a:tcPr/>
+                </a:tc>
+              </a:tr>
+              <a:tr h="509182">
+                <a:tc>
+                  <a:txBody>
+                    <a:bodyPr/>
+                    <a:lstStyle/>
+                    <a:p>
+                      <a:r>
+                        <a:rPr lang="fr-FR" dirty="0" smtClean="0"/>
+                        <a:t>1</a:t>
+                      </a:r>
+                      <a:endParaRPr lang="fr-FR" dirty="0"/>
+                    </a:p>
+                  </a:txBody>
+                  <a:tcPr/>
+                </a:tc>
+                <a:tc>
+                  <a:txBody>
+                    <a:bodyPr/>
+                    <a:lstStyle/>
+                    <a:p>
+                      <a:r>
+                        <a:rPr lang="fr-FR" dirty="0" smtClean="0"/>
+                        <a:t>Échelle</a:t>
+                      </a:r>
+                      <a:endParaRPr lang="fr-FR" dirty="0"/>
+                    </a:p>
+                  </a:txBody>
+                  <a:tcPr/>
+                </a:tc>
+                <a:tc>
+                  <a:txBody>
+                    <a:bodyPr/>
+                    <a:lstStyle/>
+                    <a:p>
+                      <a:r>
+                        <a:rPr lang="fr-FR" dirty="0" smtClean="0"/>
+                        <a:t>55g</a:t>
+                      </a:r>
+                      <a:endParaRPr lang="fr-FR" dirty="0"/>
+                    </a:p>
+                  </a:txBody>
+                  <a:tcPr/>
+                </a:tc>
+                <a:tc>
+                  <a:txBody>
+                    <a:bodyPr/>
+                    <a:lstStyle/>
+                    <a:p>
+                      <a:r>
+                        <a:rPr lang="fr-FR" dirty="0" smtClean="0"/>
+                        <a:t>1</a:t>
+                      </a:r>
+                      <a:endParaRPr lang="fr-FR" dirty="0"/>
+                    </a:p>
+                  </a:txBody>
+                  <a:tcPr/>
+                </a:tc>
+              </a:tr>
+              <a:tr h="509182">
+                <a:tc>
+                  <a:txBody>
+                    <a:bodyPr/>
+                    <a:lstStyle/>
+                    <a:p>
+                      <a:r>
+                        <a:rPr lang="fr-FR" dirty="0" smtClean="0"/>
+                        <a:t>2</a:t>
+                      </a:r>
+                      <a:endParaRPr lang="fr-FR" dirty="0"/>
+                    </a:p>
+                  </a:txBody>
+                  <a:tcPr/>
+                </a:tc>
+                <a:tc>
+                  <a:txBody>
+                    <a:bodyPr/>
+                    <a:lstStyle/>
+                    <a:p>
+                      <a:r>
+                        <a:rPr lang="fr-FR" dirty="0" smtClean="0"/>
+                        <a:t>Planche</a:t>
+                      </a:r>
+                      <a:endParaRPr lang="fr-FR" dirty="0"/>
+                    </a:p>
+                  </a:txBody>
+                  <a:tcPr/>
+                </a:tc>
+                <a:tc>
+                  <a:txBody>
+                    <a:bodyPr/>
+                    <a:lstStyle/>
+                    <a:p>
+                      <a:r>
+                        <a:rPr lang="fr-FR" dirty="0" smtClean="0"/>
+                        <a:t>32g</a:t>
+                      </a:r>
+                      <a:endParaRPr lang="fr-FR" dirty="0"/>
+                    </a:p>
+                  </a:txBody>
+                  <a:tcPr/>
+                </a:tc>
+                <a:tc>
+                  <a:txBody>
+                    <a:bodyPr/>
+                    <a:lstStyle/>
+                    <a:p>
+                      <a:r>
+                        <a:rPr lang="fr-FR" dirty="0" smtClean="0"/>
+                        <a:t>1</a:t>
+                      </a:r>
+                      <a:endParaRPr lang="fr-FR" dirty="0"/>
+                    </a:p>
+                  </a:txBody>
+                  <a:tcPr/>
+                </a:tc>
+              </a:tr>
+              <a:tr h="509182">
+                <a:tc>
+                  <a:txBody>
+                    <a:bodyPr/>
+                    <a:lstStyle/>
+                    <a:p>
+                      <a:r>
+                        <a:rPr lang="fr-FR" dirty="0" smtClean="0"/>
+                        <a:t>3</a:t>
+                      </a:r>
+                      <a:endParaRPr lang="fr-FR" dirty="0"/>
+                    </a:p>
+                  </a:txBody>
+                  <a:tcPr/>
+                </a:tc>
+                <a:tc>
+                  <a:txBody>
+                    <a:bodyPr/>
+                    <a:lstStyle/>
+                    <a:p>
+                      <a:r>
+                        <a:rPr lang="fr-FR" dirty="0" smtClean="0"/>
+                        <a:t>Boite</a:t>
+                      </a:r>
+                      <a:endParaRPr lang="fr-FR" dirty="0"/>
+                    </a:p>
+                  </a:txBody>
+                  <a:tcPr/>
+                </a:tc>
+                <a:tc>
+                  <a:txBody>
+                    <a:bodyPr/>
+                    <a:lstStyle/>
+                    <a:p>
+                      <a:r>
+                        <a:rPr lang="fr-FR" dirty="0" smtClean="0"/>
+                        <a:t>12g</a:t>
+                      </a:r>
+                      <a:endParaRPr lang="fr-FR" dirty="0"/>
+                    </a:p>
+                  </a:txBody>
+                  <a:tcPr/>
+                </a:tc>
+                <a:tc>
+                  <a:txBody>
+                    <a:bodyPr/>
+                    <a:lstStyle/>
+                    <a:p>
+                      <a:r>
+                        <a:rPr lang="fr-FR" dirty="0" smtClean="0"/>
+                        <a:t>3</a:t>
+                      </a:r>
+                      <a:endParaRPr lang="fr-FR" dirty="0"/>
+                    </a:p>
+                  </a:txBody>
+                  <a:tcPr/>
+                </a:tc>
+              </a:tr>
+              <a:tr h="509182">
+                <a:tc>
+                  <a:txBody>
+                    <a:bodyPr/>
+                    <a:lstStyle/>
+                    <a:p>
+                      <a:r>
+                        <a:rPr lang="fr-FR" dirty="0" smtClean="0"/>
+                        <a:t>4</a:t>
+                      </a:r>
+                      <a:endParaRPr lang="fr-FR" dirty="0"/>
+                    </a:p>
+                  </a:txBody>
+                  <a:tcPr/>
+                </a:tc>
+                <a:tc>
+                  <a:txBody>
+                    <a:bodyPr/>
+                    <a:lstStyle/>
+                    <a:p>
+                      <a:r>
+                        <a:rPr lang="fr-FR" dirty="0" smtClean="0"/>
+                        <a:t>Médicament</a:t>
+                      </a:r>
+                      <a:endParaRPr lang="fr-FR" dirty="0"/>
+                    </a:p>
+                  </a:txBody>
+                  <a:tcPr/>
+                </a:tc>
+                <a:tc>
+                  <a:txBody>
+                    <a:bodyPr/>
+                    <a:lstStyle/>
+                    <a:p>
+                      <a:r>
+                        <a:rPr lang="fr-FR" dirty="0" smtClean="0"/>
+                        <a:t>3g</a:t>
+                      </a:r>
+                      <a:endParaRPr lang="fr-FR" dirty="0"/>
+                    </a:p>
+                  </a:txBody>
+                  <a:tcPr/>
+                </a:tc>
+                <a:tc>
+                  <a:txBody>
+                    <a:bodyPr/>
+                    <a:lstStyle/>
+                    <a:p>
+                      <a:r>
+                        <a:rPr lang="fr-FR" dirty="0" smtClean="0"/>
+                        <a:t>53</a:t>
+                      </a:r>
+                      <a:endParaRPr lang="fr-FR" dirty="0"/>
+                    </a:p>
+                  </a:txBody>
+                  <a:tcPr/>
+                </a:tc>
+              </a:tr>
+              <a:tr h="509182">
+                <a:tc>
+                  <a:txBody>
+                    <a:bodyPr/>
+                    <a:lstStyle/>
+                    <a:p>
+                      <a:endParaRPr lang="fr-FR" dirty="0"/>
+                    </a:p>
+                  </a:txBody>
+                  <a:tcPr/>
+                </a:tc>
+                <a:tc>
+                  <a:txBody>
+                    <a:bodyPr/>
+                    <a:lstStyle/>
+                    <a:p>
+                      <a:endParaRPr lang="fr-FR" dirty="0"/>
+                    </a:p>
+                  </a:txBody>
+                  <a:tcPr/>
+                </a:tc>
+                <a:tc>
+                  <a:txBody>
+                    <a:bodyPr/>
+                    <a:lstStyle/>
+                    <a:p>
+                      <a:endParaRPr lang="fr-FR" dirty="0"/>
+                    </a:p>
+                  </a:txBody>
+                  <a:tcPr/>
+                </a:tc>
+                <a:tc>
+                  <a:txBody>
+                    <a:bodyPr/>
+                    <a:lstStyle/>
+                    <a:p>
+                      <a:endParaRPr lang="fr-FR" dirty="0"/>
+                    </a:p>
+                  </a:txBody>
+                  <a:tcPr/>
+                </a:tc>
+              </a:tr>
+              <a:tr h="509182">
+                <a:tc>
+                  <a:txBody>
+                    <a:bodyPr/>
+                    <a:lstStyle/>
+                    <a:p>
+                      <a:endParaRPr lang="fr-FR"/>
+                    </a:p>
+                  </a:txBody>
+                  <a:tcPr/>
+                </a:tc>
+                <a:tc>
+                  <a:txBody>
+                    <a:bodyPr/>
+                    <a:lstStyle/>
+                    <a:p>
+                      <a:endParaRPr lang="fr-FR"/>
+                    </a:p>
+                  </a:txBody>
+                  <a:tcPr/>
+                </a:tc>
+                <a:tc>
+                  <a:txBody>
+                    <a:bodyPr/>
+                    <a:lstStyle/>
+                    <a:p>
+                      <a:endParaRPr lang="fr-FR" dirty="0"/>
+                    </a:p>
+                  </a:txBody>
+                  <a:tcPr/>
+                </a:tc>
+                <a:tc>
+                  <a:txBody>
+                    <a:bodyPr/>
+                    <a:lstStyle/>
+                    <a:p>
+                      <a:endParaRPr lang="fr-FR" dirty="0"/>
+                    </a:p>
+                  </a:txBody>
+                  <a:tcPr/>
+                </a:tc>
+              </a:tr>
+              <a:tr h="509182">
+                <a:tc>
+                  <a:txBody>
+                    <a:bodyPr/>
+                    <a:lstStyle/>
+                    <a:p>
+                      <a:endParaRPr lang="fr-FR"/>
+                    </a:p>
+                  </a:txBody>
+                  <a:tcPr/>
+                </a:tc>
+                <a:tc>
+                  <a:txBody>
+                    <a:bodyPr/>
+                    <a:lstStyle/>
+                    <a:p>
+                      <a:endParaRPr lang="fr-FR"/>
+                    </a:p>
+                  </a:txBody>
+                  <a:tcPr/>
+                </a:tc>
+                <a:tc>
+                  <a:txBody>
+                    <a:bodyPr/>
+                    <a:lstStyle/>
+                    <a:p>
+                      <a:endParaRPr lang="fr-FR"/>
+                    </a:p>
+                  </a:txBody>
+                  <a:tcPr/>
+                </a:tc>
+                <a:tc>
+                  <a:txBody>
+                    <a:bodyPr/>
+                    <a:lstStyle/>
+                    <a:p>
+                      <a:endParaRPr lang="fr-FR" dirty="0"/>
+                    </a:p>
+                  </a:txBody>
+                  <a:tcPr/>
+                </a:tc>
+              </a:tr>
+              <a:tr h="509182">
+                <a:tc>
+                  <a:txBody>
+                    <a:bodyPr/>
+                    <a:lstStyle/>
+                    <a:p>
+                      <a:endParaRPr lang="fr-FR"/>
+                    </a:p>
+                  </a:txBody>
+                  <a:tcPr/>
+                </a:tc>
+                <a:tc>
+                  <a:txBody>
+                    <a:bodyPr/>
+                    <a:lstStyle/>
+                    <a:p>
+                      <a:endParaRPr lang="fr-FR"/>
+                    </a:p>
+                  </a:txBody>
+                  <a:tcPr/>
+                </a:tc>
+                <a:tc>
+                  <a:txBody>
+                    <a:bodyPr/>
+                    <a:lstStyle/>
+                    <a:p>
+                      <a:endParaRPr lang="fr-FR"/>
+                    </a:p>
+                  </a:txBody>
+                  <a:tcPr/>
+                </a:tc>
+                <a:tc>
+                  <a:txBody>
+                    <a:bodyPr/>
+                    <a:lstStyle/>
+                    <a:p>
+                      <a:endParaRPr lang="fr-FR" dirty="0"/>
+                    </a:p>
+                  </a:txBody>
+                  <a:tcPr/>
+                </a:tc>
+              </a:tr>
+              <a:tr h="509182">
+                <a:tc>
+                  <a:txBody>
+                    <a:bodyPr/>
+                    <a:lstStyle/>
+                    <a:p>
+                      <a:endParaRPr lang="fr-FR"/>
+                    </a:p>
+                  </a:txBody>
+                  <a:tcPr/>
+                </a:tc>
+                <a:tc>
+                  <a:txBody>
+                    <a:bodyPr/>
+                    <a:lstStyle/>
+                    <a:p>
+                      <a:endParaRPr lang="fr-FR"/>
+                    </a:p>
+                  </a:txBody>
+                  <a:tcPr/>
+                </a:tc>
+                <a:tc>
+                  <a:txBody>
+                    <a:bodyPr/>
+                    <a:lstStyle/>
+                    <a:p>
+                      <a:endParaRPr lang="fr-FR"/>
+                    </a:p>
+                  </a:txBody>
+                  <a:tcPr/>
+                </a:tc>
+                <a:tc>
+                  <a:txBody>
+                    <a:bodyPr/>
+                    <a:lstStyle/>
+                    <a:p>
+                      <a:endParaRPr lang="fr-FR" dirty="0"/>
+                    </a:p>
+                  </a:txBody>
+                  <a:tcPr/>
+                </a:tc>
+              </a:tr>
+              <a:tr h="509182">
+                <a:tc>
+                  <a:txBody>
+                    <a:bodyPr/>
+                    <a:lstStyle/>
+                    <a:p>
+                      <a:endParaRPr lang="fr-FR"/>
+                    </a:p>
+                  </a:txBody>
+                  <a:tcPr/>
+                </a:tc>
+                <a:tc>
+                  <a:txBody>
+                    <a:bodyPr/>
+                    <a:lstStyle/>
+                    <a:p>
+                      <a:endParaRPr lang="fr-FR"/>
+                    </a:p>
+                  </a:txBody>
+                  <a:tcPr/>
+                </a:tc>
+                <a:tc>
+                  <a:txBody>
+                    <a:bodyPr/>
+                    <a:lstStyle/>
+                    <a:p>
+                      <a:endParaRPr lang="fr-FR"/>
+                    </a:p>
+                  </a:txBody>
+                  <a:tcPr/>
+                </a:tc>
+                <a:tc>
+                  <a:txBody>
+                    <a:bodyPr/>
+                    <a:lstStyle/>
+                    <a:p>
+                      <a:endParaRPr lang="fr-FR" dirty="0"/>
+                    </a:p>
+                  </a:txBody>
+                  <a:tcPr/>
+                </a:tc>
+              </a:tr>
+              <a:tr h="509182">
+                <a:tc>
+                  <a:txBody>
+                    <a:bodyPr/>
+                    <a:lstStyle/>
+                    <a:p>
+                      <a:endParaRPr lang="fr-FR"/>
+                    </a:p>
+                  </a:txBody>
+                  <a:tcPr/>
+                </a:tc>
+                <a:tc>
+                  <a:txBody>
+                    <a:bodyPr/>
+                    <a:lstStyle/>
+                    <a:p>
+                      <a:endParaRPr lang="fr-FR"/>
+                    </a:p>
+                  </a:txBody>
+                  <a:tcPr/>
+                </a:tc>
+                <a:tc>
+                  <a:txBody>
+                    <a:bodyPr/>
+                    <a:lstStyle/>
+                    <a:p>
+                      <a:endParaRPr lang="fr-FR"/>
+                    </a:p>
+                  </a:txBody>
+                  <a:tcPr/>
+                </a:tc>
+                <a:tc>
+                  <a:txBody>
+                    <a:bodyPr/>
+                    <a:lstStyle/>
+                    <a:p>
+                      <a:endParaRPr lang="fr-FR" dirty="0"/>
+                    </a:p>
+                  </a:txBody>
+                  <a:tcPr/>
+                </a:tc>
+              </a:tr>
+            </a:tbl>
+          </a:graphicData>
+        </a:graphic>
+      </p:graphicFrame>
+      <p:sp>
+        <p:nvSpPr>
+          <p:cNvPr id="21" name="Rectangle 20"/>
+          <p:cNvSpPr/>
+          <p:nvPr/>
+        </p:nvSpPr>
+        <p:spPr>
+          <a:xfrm>
+            <a:off x="642910" y="3000372"/>
+            <a:ext cx="2000264" cy="500066"/>
+          </a:xfrm>
+          <a:prstGeom prst="rect">
+            <a:avLst/>
+          </a:prstGeom>
+        </p:spPr>
+        <p:style>
+          <a:lnRef idx="2">
+            <a:schemeClr val="accent1"/>
+          </a:lnRef>
+          <a:fillRef idx="1">
+            <a:schemeClr val="lt1"/>
+          </a:fillRef>
+          <a:effectRef idx="0">
+            <a:schemeClr val="accent1"/>
+          </a:effectRef>
+          <a:fontRef idx="minor">
+            <a:schemeClr val="dk1"/>
+          </a:fontRef>
+        </p:style>
+        <p:txBody>
+          <a:bodyPr rtlCol="0" anchor="ctr"/>
+          <a:lstStyle/>
+          <a:p>
+            <a:pPr algn="ctr"/>
+            <a:r>
+              <a:rPr lang="fr-FR" dirty="0" smtClean="0"/>
+              <a:t>Ajouter</a:t>
+            </a:r>
+            <a:endParaRPr lang="fr-FR" dirty="0"/>
           </a:p>
         </p:txBody>
       </p:sp>

</xml_diff>